<commit_message>
Added Lab 8 Instructions
</commit_message>
<xml_diff>
--- a/Lab7/Instructions/Lab 7 Slides.pptx
+++ b/Lab7/Instructions/Lab 7 Slides.pptx
@@ -270,7 +270,7 @@
           <a:p>
             <a:fld id="{F591BB15-DE40-F842-8059-510BF077C15F}" type="datetimeFigureOut">
               <a:rPr lang="en-US" smtClean="0"/>
-              <a:t>2/29/24</a:t>
+              <a:t>3/8/2024</a:t>
             </a:fld>
             <a:endParaRPr lang="en-US"/>
           </a:p>
@@ -507,10 +507,10 @@
           </a:ln>
           <a:extLst>
             <a:ext uri="{FAA26D3D-D897-4be2-8F04-BA451C77F1D7}">
-              <ma14:placeholderFlag xmlns:ma14="http://schemas.microsoft.com/office/mac/drawingml/2011/main" xmlns="" val="1"/>
+              <ma14:placeholderFlag xmlns="" xmlns:ma14="http://schemas.microsoft.com/office/mac/drawingml/2011/main" val="1"/>
             </a:ext>
             <a:ext uri="{909E8E84-426E-40dd-AFC4-6F175D3DCCD1}">
-              <a14:hiddenFill xmlns:a14="http://schemas.microsoft.com/office/drawing/2010/main" xmlns="">
+              <a14:hiddenFill xmlns="" xmlns:a14="http://schemas.microsoft.com/office/drawing/2010/main">
                 <a:solidFill>
                   <a:srgbClr val="FFFFFF"/>
                 </a:solidFill>
@@ -4442,17 +4442,17 @@
           </a:ln>
           <a:extLst>
             <a:ext uri="{FAA26D3D-D897-4be2-8F04-BA451C77F1D7}">
-              <ma14:placeholderFlag xmlns:ma14="http://schemas.microsoft.com/office/mac/drawingml/2011/main" xmlns="" val="1"/>
+              <ma14:placeholderFlag xmlns="" xmlns:ma14="http://schemas.microsoft.com/office/mac/drawingml/2011/main" val="1"/>
             </a:ext>
             <a:ext uri="{909E8E84-426E-40dd-AFC4-6F175D3DCCD1}">
-              <a14:hiddenFill xmlns:a14="http://schemas.microsoft.com/office/drawing/2010/main" xmlns="">
+              <a14:hiddenFill xmlns="" xmlns:a14="http://schemas.microsoft.com/office/drawing/2010/main">
                 <a:solidFill>
                   <a:srgbClr val="FFFFFF"/>
                 </a:solidFill>
               </a14:hiddenFill>
             </a:ext>
             <a:ext uri="{91240B29-F687-4f45-9708-019B960494DF}">
-              <a14:hiddenLine xmlns:a14="http://schemas.microsoft.com/office/drawing/2010/main" xmlns="" w="9525">
+              <a14:hiddenLine xmlns="" xmlns:a14="http://schemas.microsoft.com/office/drawing/2010/main" w="9525">
                 <a:solidFill>
                   <a:srgbClr val="000000"/>
                 </a:solidFill>
@@ -4524,17 +4524,17 @@
           </a:ln>
           <a:extLst>
             <a:ext uri="{FAA26D3D-D897-4be2-8F04-BA451C77F1D7}">
-              <ma14:placeholderFlag xmlns:ma14="http://schemas.microsoft.com/office/mac/drawingml/2011/main" xmlns="" val="1"/>
+              <ma14:placeholderFlag xmlns="" xmlns:ma14="http://schemas.microsoft.com/office/mac/drawingml/2011/main" val="1"/>
             </a:ext>
             <a:ext uri="{909E8E84-426E-40dd-AFC4-6F175D3DCCD1}">
-              <a14:hiddenFill xmlns:a14="http://schemas.microsoft.com/office/drawing/2010/main" xmlns="">
+              <a14:hiddenFill xmlns="" xmlns:a14="http://schemas.microsoft.com/office/drawing/2010/main">
                 <a:solidFill>
                   <a:srgbClr val="FFFFFF"/>
                 </a:solidFill>
               </a14:hiddenFill>
             </a:ext>
             <a:ext uri="{91240B29-F687-4f45-9708-019B960494DF}">
-              <a14:hiddenLine xmlns:a14="http://schemas.microsoft.com/office/drawing/2010/main" xmlns="" w="9525">
+              <a14:hiddenLine xmlns="" xmlns:a14="http://schemas.microsoft.com/office/drawing/2010/main" w="9525">
                 <a:solidFill>
                   <a:srgbClr val="000000"/>
                 </a:solidFill>
@@ -5377,17 +5377,17 @@
             </a:ln>
             <a:extLst>
               <a:ext uri="{FAA26D3D-D897-4be2-8F04-BA451C77F1D7}">
-                <ma14:placeholderFlag xmlns:ma14="http://schemas.microsoft.com/office/mac/drawingml/2011/main" xmlns="" val="1"/>
+                <ma14:placeholderFlag xmlns="" xmlns:ma14="http://schemas.microsoft.com/office/mac/drawingml/2011/main" val="1"/>
               </a:ext>
               <a:ext uri="{909E8E84-426E-40dd-AFC4-6F175D3DCCD1}">
-                <a14:hiddenFill xmlns:a14="http://schemas.microsoft.com/office/drawing/2010/main" xmlns="">
+                <a14:hiddenFill xmlns="" xmlns:a14="http://schemas.microsoft.com/office/drawing/2010/main">
                   <a:solidFill>
                     <a:srgbClr val="FFFFFF"/>
                   </a:solidFill>
                 </a14:hiddenFill>
               </a:ext>
               <a:ext uri="{91240B29-F687-4f45-9708-019B960494DF}">
-                <a14:hiddenLine xmlns:a14="http://schemas.microsoft.com/office/drawing/2010/main" xmlns="" w="9525">
+                <a14:hiddenLine xmlns="" xmlns:a14="http://schemas.microsoft.com/office/drawing/2010/main" w="9525">
                   <a:solidFill>
                     <a:srgbClr val="000000"/>
                   </a:solidFill>
@@ -5574,17 +5574,17 @@
             </a:ln>
             <a:extLst>
               <a:ext uri="{FAA26D3D-D897-4be2-8F04-BA451C77F1D7}">
-                <ma14:placeholderFlag xmlns:ma14="http://schemas.microsoft.com/office/mac/drawingml/2011/main" xmlns="" val="1"/>
+                <ma14:placeholderFlag xmlns="" xmlns:ma14="http://schemas.microsoft.com/office/mac/drawingml/2011/main" val="1"/>
               </a:ext>
               <a:ext uri="{909E8E84-426E-40dd-AFC4-6F175D3DCCD1}">
-                <a14:hiddenFill xmlns:a14="http://schemas.microsoft.com/office/drawing/2010/main" xmlns="">
+                <a14:hiddenFill xmlns="" xmlns:a14="http://schemas.microsoft.com/office/drawing/2010/main">
                   <a:solidFill>
                     <a:srgbClr val="FFFFFF"/>
                   </a:solidFill>
                 </a14:hiddenFill>
               </a:ext>
               <a:ext uri="{91240B29-F687-4f45-9708-019B960494DF}">
-                <a14:hiddenLine xmlns:a14="http://schemas.microsoft.com/office/drawing/2010/main" xmlns="" w="9525">
+                <a14:hiddenLine xmlns="" xmlns:a14="http://schemas.microsoft.com/office/drawing/2010/main" w="9525">
                   <a:solidFill>
                     <a:srgbClr val="000000"/>
                   </a:solidFill>
@@ -5791,17 +5791,17 @@
             </a:ln>
             <a:extLst>
               <a:ext uri="{FAA26D3D-D897-4be2-8F04-BA451C77F1D7}">
-                <ma14:placeholderFlag xmlns:ma14="http://schemas.microsoft.com/office/mac/drawingml/2011/main" xmlns="" val="1"/>
+                <ma14:placeholderFlag xmlns="" xmlns:ma14="http://schemas.microsoft.com/office/mac/drawingml/2011/main" val="1"/>
               </a:ext>
               <a:ext uri="{909E8E84-426E-40dd-AFC4-6F175D3DCCD1}">
-                <a14:hiddenFill xmlns:a14="http://schemas.microsoft.com/office/drawing/2010/main" xmlns="">
+                <a14:hiddenFill xmlns="" xmlns:a14="http://schemas.microsoft.com/office/drawing/2010/main">
                   <a:solidFill>
                     <a:srgbClr val="FFFFFF"/>
                   </a:solidFill>
                 </a14:hiddenFill>
               </a:ext>
               <a:ext uri="{91240B29-F687-4f45-9708-019B960494DF}">
-                <a14:hiddenLine xmlns:a14="http://schemas.microsoft.com/office/drawing/2010/main" xmlns="" w="9525">
+                <a14:hiddenLine xmlns="" xmlns:a14="http://schemas.microsoft.com/office/drawing/2010/main" w="9525">
                   <a:solidFill>
                     <a:srgbClr val="000000"/>
                   </a:solidFill>
@@ -6719,17 +6719,17 @@
           </a:ln>
           <a:extLst>
             <a:ext uri="{FAA26D3D-D897-4be2-8F04-BA451C77F1D7}">
-              <ma14:placeholderFlag xmlns="" xmlns:ma14="http://schemas.microsoft.com/office/mac/drawingml/2011/main" val="1"/>
+              <ma14:placeholderFlag xmlns:ma14="http://schemas.microsoft.com/office/mac/drawingml/2011/main" xmlns="" val="1"/>
             </a:ext>
             <a:ext uri="{909E8E84-426E-40dd-AFC4-6F175D3DCCD1}">
-              <a14:hiddenFill xmlns="" xmlns:a14="http://schemas.microsoft.com/office/drawing/2010/main">
+              <a14:hiddenFill xmlns:a14="http://schemas.microsoft.com/office/drawing/2010/main" xmlns="">
                 <a:solidFill>
                   <a:srgbClr val="FFFFFF"/>
                 </a:solidFill>
               </a14:hiddenFill>
             </a:ext>
             <a:ext uri="{91240B29-F687-4f45-9708-019B960494DF}">
-              <a14:hiddenLine xmlns="" xmlns:a14="http://schemas.microsoft.com/office/drawing/2010/main" w="9525">
+              <a14:hiddenLine xmlns:a14="http://schemas.microsoft.com/office/drawing/2010/main" xmlns="" w="9525">
                 <a:solidFill>
                   <a:srgbClr val="000000"/>
                 </a:solidFill>
@@ -6889,17 +6889,17 @@
           </a:ln>
           <a:extLst>
             <a:ext uri="{FAA26D3D-D897-4be2-8F04-BA451C77F1D7}">
-              <ma14:placeholderFlag xmlns:ma14="http://schemas.microsoft.com/office/mac/drawingml/2011/main" xmlns="" val="1"/>
+              <ma14:placeholderFlag xmlns="" xmlns:ma14="http://schemas.microsoft.com/office/mac/drawingml/2011/main" val="1"/>
             </a:ext>
             <a:ext uri="{909E8E84-426E-40dd-AFC4-6F175D3DCCD1}">
-              <a14:hiddenFill xmlns:a14="http://schemas.microsoft.com/office/drawing/2010/main" xmlns="">
+              <a14:hiddenFill xmlns="" xmlns:a14="http://schemas.microsoft.com/office/drawing/2010/main">
                 <a:solidFill>
                   <a:srgbClr val="FFFFFF"/>
                 </a:solidFill>
               </a14:hiddenFill>
             </a:ext>
             <a:ext uri="{91240B29-F687-4f45-9708-019B960494DF}">
-              <a14:hiddenLine xmlns:a14="http://schemas.microsoft.com/office/drawing/2010/main" xmlns="" w="9525">
+              <a14:hiddenLine xmlns="" xmlns:a14="http://schemas.microsoft.com/office/drawing/2010/main" w="9525">
                 <a:solidFill>
                   <a:srgbClr val="000000"/>
                 </a:solidFill>
@@ -9838,17 +9838,17 @@
           </a:ln>
           <a:extLst>
             <a:ext uri="{FAA26D3D-D897-4be2-8F04-BA451C77F1D7}">
-              <ma14:placeholderFlag xmlns:ma14="http://schemas.microsoft.com/office/mac/drawingml/2011/main" xmlns="" val="1"/>
+              <ma14:placeholderFlag xmlns="" xmlns:ma14="http://schemas.microsoft.com/office/mac/drawingml/2011/main" val="1"/>
             </a:ext>
             <a:ext uri="{909E8E84-426E-40dd-AFC4-6F175D3DCCD1}">
-              <a14:hiddenFill xmlns:a14="http://schemas.microsoft.com/office/drawing/2010/main" xmlns="">
+              <a14:hiddenFill xmlns="" xmlns:a14="http://schemas.microsoft.com/office/drawing/2010/main">
                 <a:solidFill>
                   <a:srgbClr val="FFFFFF"/>
                 </a:solidFill>
               </a14:hiddenFill>
             </a:ext>
             <a:ext uri="{91240B29-F687-4f45-9708-019B960494DF}">
-              <a14:hiddenLine xmlns:a14="http://schemas.microsoft.com/office/drawing/2010/main" xmlns="" w="9525">
+              <a14:hiddenLine xmlns="" xmlns:a14="http://schemas.microsoft.com/office/drawing/2010/main" w="9525">
                 <a:solidFill>
                   <a:srgbClr val="000000"/>
                 </a:solidFill>
@@ -10973,17 +10973,17 @@
           </a:ln>
           <a:extLst>
             <a:ext uri="{FAA26D3D-D897-4be2-8F04-BA451C77F1D7}">
-              <ma14:placeholderFlag xmlns:ma14="http://schemas.microsoft.com/office/mac/drawingml/2011/main" xmlns="" val="1"/>
+              <ma14:placeholderFlag xmlns="" xmlns:ma14="http://schemas.microsoft.com/office/mac/drawingml/2011/main" val="1"/>
             </a:ext>
             <a:ext uri="{909E8E84-426E-40dd-AFC4-6F175D3DCCD1}">
-              <a14:hiddenFill xmlns:a14="http://schemas.microsoft.com/office/drawing/2010/main" xmlns="">
+              <a14:hiddenFill xmlns="" xmlns:a14="http://schemas.microsoft.com/office/drawing/2010/main">
                 <a:solidFill>
                   <a:srgbClr val="FFFFFF"/>
                 </a:solidFill>
               </a14:hiddenFill>
             </a:ext>
             <a:ext uri="{91240B29-F687-4f45-9708-019B960494DF}">
-              <a14:hiddenLine xmlns:a14="http://schemas.microsoft.com/office/drawing/2010/main" xmlns="" w="9525">
+              <a14:hiddenLine xmlns="" xmlns:a14="http://schemas.microsoft.com/office/drawing/2010/main" w="9525">
                 <a:solidFill>
                   <a:srgbClr val="000000"/>
                 </a:solidFill>

</xml_diff>